<commit_message>
Remoção de link de arquivos
</commit_message>
<xml_diff>
--- a/Aula09-Formulários no Flutter/Aula09-Formulários no Flutter.pptx
+++ b/Aula09-Formulários no Flutter/Aula09-Formulários no Flutter.pptx
@@ -166,7 +166,7 @@
 <file path=ppt/revisionInfo.xml><?xml version="1.0" encoding="utf-8"?>
 <p1510:revInfo xmlns:a="http://schemas.openxmlformats.org/drawingml/2006/main" xmlns:r="http://schemas.openxmlformats.org/officeDocument/2006/relationships" xmlns:p1510="http://schemas.microsoft.com/office/powerpoint/2015/10/main">
   <p1510:revLst>
-    <p1510:client id="{56882BCF-A78E-446B-908F-4EA5FE367AD0}" v="326" dt="2024-03-31T18:40:26.101"/>
+    <p1510:client id="{56882BCF-A78E-446B-908F-4EA5FE367AD0}" v="356" dt="2024-03-31T18:42:18.212"/>
   </p1510:revLst>
 </p1510:revInfo>
 </file>
@@ -3791,7 +3791,7 @@
         <p:spPr>
           <a:xfrm>
             <a:off x="386785" y="1907673"/>
-            <a:ext cx="8296025" cy="1225550"/>
+            <a:ext cx="8296025" cy="1195264"/>
           </a:xfrm>
           <a:prstGeom prst="rect">
             <a:avLst/>
@@ -3803,7 +3803,7 @@
           </a:bodyPr>
           <a:lstStyle/>
           <a:p>
-            <a:pPr marL="755651" lvl="1" indent="-377825" algn="just">
+            <a:pPr marL="755650" lvl="1" indent="-377825" algn="just">
               <a:lnSpc>
                 <a:spcPts val="4900"/>
               </a:lnSpc>
@@ -3811,13 +3811,22 @@
               <a:buChar char="•"/>
             </a:pPr>
             <a:r>
+              <a:rPr lang="en-US" sz="3500" spc="350" dirty="0" err="1">
+                <a:solidFill>
+                  <a:srgbClr val="000000"/>
+                </a:solidFill>
+                <a:latin typeface="Lato"/>
+              </a:rPr>
+              <a:t>Acesse</a:t>
+            </a:r>
+            <a:r>
               <a:rPr lang="en-US" sz="3500" spc="350" dirty="0">
                 <a:solidFill>
                   <a:srgbClr val="000000"/>
                 </a:solidFill>
                 <a:latin typeface="Lato"/>
               </a:rPr>
-              <a:t>Código </a:t>
+              <a:t> o </a:t>
             </a:r>
             <a:r>
               <a:rPr lang="en-US" sz="3500" spc="350" dirty="0" err="1">
@@ -3826,6 +3835,24 @@
                 </a:solidFill>
                 <a:latin typeface="Lato"/>
               </a:rPr>
+              <a:t>código</a:t>
+            </a:r>
+            <a:r>
+              <a:rPr lang="en-US" sz="3500" spc="350" dirty="0">
+                <a:solidFill>
+                  <a:srgbClr val="000000"/>
+                </a:solidFill>
+                <a:latin typeface="Lato"/>
+              </a:rPr>
+              <a:t> </a:t>
+            </a:r>
+            <a:r>
+              <a:rPr lang="en-US" sz="3500" spc="350" dirty="0" err="1">
+                <a:solidFill>
+                  <a:srgbClr val="000000"/>
+                </a:solidFill>
+                <a:latin typeface="Lato"/>
+              </a:rPr>
               <a:t>completo</a:t>
             </a:r>
             <a:r>
@@ -3844,7 +3871,7 @@
                 </a:solidFill>
                 <a:latin typeface="Lato"/>
               </a:rPr>
-              <a:t>disponível</a:t>
+              <a:t>em</a:t>
             </a:r>
             <a:r>
               <a:rPr lang="en-US" sz="3500" spc="350" dirty="0">
@@ -3856,24 +3883,22 @@
               <a:t> </a:t>
             </a:r>
             <a:r>
-              <a:rPr lang="en-US" sz="3500" u="sng" spc="350" dirty="0">
-                <a:solidFill>
-                  <a:srgbClr val="5271FF"/>
-                </a:solidFill>
-                <a:latin typeface="Lato"/>
-                <a:hlinkClick r:id="rId3" tooltip="https://github.com/marcosdosea/TreinamentoFlutter/blob/main/Aula09-Formul%C3%A1rios%20no%20Flutter/form.dart"/>
-              </a:rPr>
-              <a:t>aqui</a:t>
-            </a:r>
-            <a:r>
-              <a:rPr lang="en-US" sz="3500" spc="350" dirty="0">
-                <a:solidFill>
-                  <a:srgbClr val="000000"/>
-                </a:solidFill>
-                <a:latin typeface="Lato"/>
-              </a:rPr>
-              <a:t>.</a:t>
-            </a:r>
+              <a:rPr lang="en-US" sz="3500" spc="350" dirty="0" err="1">
+                <a:solidFill>
+                  <a:srgbClr val="000000"/>
+                </a:solidFill>
+                <a:latin typeface="Lato"/>
+              </a:rPr>
+              <a:t>form.dart</a:t>
+            </a:r>
+            <a:endParaRPr lang="en-US" sz="3500" u="sng" spc="350" dirty="0" err="1">
+              <a:solidFill>
+                <a:srgbClr val="5271FF"/>
+              </a:solidFill>
+              <a:latin typeface="Lato"/>
+              <a:ea typeface="Lato"/>
+              <a:cs typeface="Lato"/>
+            </a:endParaRPr>
           </a:p>
         </p:txBody>
       </p:sp>

</xml_diff>